<commit_message>
PPT and read me files
</commit_message>
<xml_diff>
--- a/Python for data analysis.pptx
+++ b/Python for data analysis.pptx
@@ -10,6 +10,13 @@
     <p:sldId id="258" r:id="rId4"/>
     <p:sldId id="259" r:id="rId5"/>
     <p:sldId id="260" r:id="rId6"/>
+    <p:sldId id="261" r:id="rId7"/>
+    <p:sldId id="262" r:id="rId8"/>
+    <p:sldId id="263" r:id="rId9"/>
+    <p:sldId id="264" r:id="rId10"/>
+    <p:sldId id="265" r:id="rId11"/>
+    <p:sldId id="266" r:id="rId12"/>
+    <p:sldId id="267" r:id="rId13"/>
   </p:sldIdLst>
   <p:sldSz cx="12192000" cy="6858000"/>
   <p:notesSz cx="6858000" cy="9144000"/>
@@ -108,6 +115,11 @@
       </a:defRPr>
     </a:lvl9pPr>
   </p:defaultTextStyle>
+  <p:extLst>
+    <p:ext uri="{EFAFB233-063F-42B5-8137-9DF3F51BA10A}">
+      <p15:sldGuideLst xmlns:p15="http://schemas.microsoft.com/office/powerpoint/2012/main"/>
+    </p:ext>
+  </p:extLst>
 </p:presentation>
 </file>
 
@@ -274,7 +286,7 @@
           <a:p>
             <a:fld id="{9E70E807-4A93-42A3-B70F-B2394DDE7ED9}" type="datetimeFigureOut">
               <a:rPr lang="fr-FR" smtClean="0"/>
-              <a:t>12/02/2019</a:t>
+              <a:t>14/02/2019</a:t>
             </a:fld>
             <a:endParaRPr lang="fr-FR"/>
           </a:p>
@@ -444,7 +456,7 @@
           <a:p>
             <a:fld id="{9E70E807-4A93-42A3-B70F-B2394DDE7ED9}" type="datetimeFigureOut">
               <a:rPr lang="fr-FR" smtClean="0"/>
-              <a:t>12/02/2019</a:t>
+              <a:t>14/02/2019</a:t>
             </a:fld>
             <a:endParaRPr lang="fr-FR"/>
           </a:p>
@@ -624,7 +636,7 @@
           <a:p>
             <a:fld id="{9E70E807-4A93-42A3-B70F-B2394DDE7ED9}" type="datetimeFigureOut">
               <a:rPr lang="fr-FR" smtClean="0"/>
-              <a:t>12/02/2019</a:t>
+              <a:t>14/02/2019</a:t>
             </a:fld>
             <a:endParaRPr lang="fr-FR"/>
           </a:p>
@@ -794,7 +806,7 @@
           <a:p>
             <a:fld id="{9E70E807-4A93-42A3-B70F-B2394DDE7ED9}" type="datetimeFigureOut">
               <a:rPr lang="fr-FR" smtClean="0"/>
-              <a:t>12/02/2019</a:t>
+              <a:t>14/02/2019</a:t>
             </a:fld>
             <a:endParaRPr lang="fr-FR"/>
           </a:p>
@@ -1062,7 +1074,7 @@
           <a:p>
             <a:fld id="{9E70E807-4A93-42A3-B70F-B2394DDE7ED9}" type="datetimeFigureOut">
               <a:rPr lang="fr-FR" smtClean="0"/>
-              <a:t>12/02/2019</a:t>
+              <a:t>14/02/2019</a:t>
             </a:fld>
             <a:endParaRPr lang="fr-FR"/>
           </a:p>
@@ -1294,7 +1306,7 @@
           <a:p>
             <a:fld id="{9E70E807-4A93-42A3-B70F-B2394DDE7ED9}" type="datetimeFigureOut">
               <a:rPr lang="fr-FR" smtClean="0"/>
-              <a:t>12/02/2019</a:t>
+              <a:t>14/02/2019</a:t>
             </a:fld>
             <a:endParaRPr lang="fr-FR"/>
           </a:p>
@@ -1653,7 +1665,7 @@
           <a:p>
             <a:fld id="{9E70E807-4A93-42A3-B70F-B2394DDE7ED9}" type="datetimeFigureOut">
               <a:rPr lang="fr-FR" smtClean="0"/>
-              <a:t>12/02/2019</a:t>
+              <a:t>14/02/2019</a:t>
             </a:fld>
             <a:endParaRPr lang="fr-FR"/>
           </a:p>
@@ -1794,7 +1806,7 @@
           <a:p>
             <a:fld id="{9E70E807-4A93-42A3-B70F-B2394DDE7ED9}" type="datetimeFigureOut">
               <a:rPr lang="fr-FR" smtClean="0"/>
-              <a:t>12/02/2019</a:t>
+              <a:t>14/02/2019</a:t>
             </a:fld>
             <a:endParaRPr lang="fr-FR"/>
           </a:p>
@@ -1889,7 +1901,7 @@
           <a:p>
             <a:fld id="{9E70E807-4A93-42A3-B70F-B2394DDE7ED9}" type="datetimeFigureOut">
               <a:rPr lang="fr-FR" smtClean="0"/>
-              <a:t>12/02/2019</a:t>
+              <a:t>14/02/2019</a:t>
             </a:fld>
             <a:endParaRPr lang="fr-FR"/>
           </a:p>
@@ -2246,7 +2258,7 @@
           <a:p>
             <a:fld id="{9E70E807-4A93-42A3-B70F-B2394DDE7ED9}" type="datetimeFigureOut">
               <a:rPr lang="fr-FR" smtClean="0"/>
-              <a:t>12/02/2019</a:t>
+              <a:t>14/02/2019</a:t>
             </a:fld>
             <a:endParaRPr lang="fr-FR"/>
           </a:p>
@@ -2603,7 +2615,7 @@
           <a:p>
             <a:fld id="{9E70E807-4A93-42A3-B70F-B2394DDE7ED9}" type="datetimeFigureOut">
               <a:rPr lang="fr-FR" smtClean="0"/>
-              <a:t>12/02/2019</a:t>
+              <a:t>14/02/2019</a:t>
             </a:fld>
             <a:endParaRPr lang="fr-FR"/>
           </a:p>
@@ -2844,7 +2856,7 @@
           <a:p>
             <a:fld id="{9E70E807-4A93-42A3-B70F-B2394DDE7ED9}" type="datetimeFigureOut">
               <a:rPr lang="fr-FR" smtClean="0"/>
-              <a:t>12/02/2019</a:t>
+              <a:t>14/02/2019</a:t>
             </a:fld>
             <a:endParaRPr lang="fr-FR"/>
           </a:p>
@@ -3384,6 +3396,447 @@
 </p:sld>
 </file>
 
+<file path=ppt/slides/slide10.xml><?xml version="1.0" encoding="utf-8"?>
+<p:sld xmlns:a="http://schemas.openxmlformats.org/drawingml/2006/main" xmlns:r="http://schemas.openxmlformats.org/officeDocument/2006/relationships" xmlns:p="http://schemas.openxmlformats.org/presentationml/2006/main">
+  <p:cSld>
+    <p:spTree>
+      <p:nvGrpSpPr>
+        <p:cNvPr id="1" name=""/>
+        <p:cNvGrpSpPr/>
+        <p:nvPr/>
+      </p:nvGrpSpPr>
+      <p:grpSpPr>
+        <a:xfrm>
+          <a:off x="0" y="0"/>
+          <a:ext cx="0" cy="0"/>
+          <a:chOff x="0" y="0"/>
+          <a:chExt cx="0" cy="0"/>
+        </a:xfrm>
+      </p:grpSpPr>
+      <p:sp>
+        <p:nvSpPr>
+          <p:cNvPr id="2" name="Titre 1">
+            <a:extLst>
+              <a:ext uri="{FF2B5EF4-FFF2-40B4-BE49-F238E27FC236}">
+                <a16:creationId xmlns:a16="http://schemas.microsoft.com/office/drawing/2014/main" id="{842797B5-B40B-4D20-A747-6068C51487C4}"/>
+              </a:ext>
+            </a:extLst>
+          </p:cNvPr>
+          <p:cNvSpPr>
+            <a:spLocks noGrp="1"/>
+          </p:cNvSpPr>
+          <p:nvPr>
+            <p:ph type="title"/>
+          </p:nvPr>
+        </p:nvSpPr>
+        <p:spPr>
+          <a:xfrm>
+            <a:off x="2231136" y="114460"/>
+            <a:ext cx="7729728" cy="1188720"/>
+          </a:xfrm>
+        </p:spPr>
+        <p:txBody>
+          <a:bodyPr/>
+          <a:lstStyle/>
+          <a:p>
+            <a:r>
+              <a:rPr lang="fr-FR" dirty="0"/>
+              <a:t>Modélisation</a:t>
+            </a:r>
+            <a:br>
+              <a:rPr lang="fr-FR" dirty="0"/>
+            </a:br>
+            <a:r>
+              <a:rPr lang="fr-FR" dirty="0" err="1"/>
+              <a:t>Random</a:t>
+            </a:r>
+            <a:r>
+              <a:rPr lang="fr-FR" dirty="0"/>
+              <a:t> </a:t>
+            </a:r>
+            <a:r>
+              <a:rPr lang="fr-FR" dirty="0" err="1"/>
+              <a:t>forest</a:t>
+            </a:r>
+            <a:endParaRPr lang="fr-FR" dirty="0"/>
+          </a:p>
+        </p:txBody>
+      </p:sp>
+      <p:sp>
+        <p:nvSpPr>
+          <p:cNvPr id="3" name="Espace réservé du contenu 2">
+            <a:extLst>
+              <a:ext uri="{FF2B5EF4-FFF2-40B4-BE49-F238E27FC236}">
+                <a16:creationId xmlns:a16="http://schemas.microsoft.com/office/drawing/2014/main" id="{3473CF4C-0AFA-40C3-B942-695AD85AA95F}"/>
+              </a:ext>
+            </a:extLst>
+          </p:cNvPr>
+          <p:cNvSpPr>
+            <a:spLocks noGrp="1"/>
+          </p:cNvSpPr>
+          <p:nvPr>
+            <p:ph idx="1"/>
+          </p:nvPr>
+        </p:nvSpPr>
+        <p:spPr>
+          <a:xfrm>
+            <a:off x="718423" y="5410201"/>
+            <a:ext cx="9242441" cy="1188720"/>
+          </a:xfrm>
+        </p:spPr>
+        <p:txBody>
+          <a:bodyPr/>
+          <a:lstStyle/>
+          <a:p>
+            <a:r>
+              <a:rPr lang="fr-FR" dirty="0"/>
+              <a:t>Dans un premier nous déterminons la meilleur valeur de N </a:t>
+            </a:r>
+            <a:r>
+              <a:rPr lang="fr-FR" dirty="0" err="1"/>
+              <a:t>estimators</a:t>
+            </a:r>
+            <a:r>
+              <a:rPr lang="fr-FR" dirty="0"/>
+              <a:t>.</a:t>
+            </a:r>
+          </a:p>
+          <a:p>
+            <a:r>
+              <a:rPr lang="fr-FR" dirty="0"/>
+              <a:t>Nous trouvons un K=56 pour une précision de 0.967.</a:t>
+            </a:r>
+          </a:p>
+        </p:txBody>
+      </p:sp>
+      <p:pic>
+        <p:nvPicPr>
+          <p:cNvPr id="6" name="Image 5">
+            <a:extLst>
+              <a:ext uri="{FF2B5EF4-FFF2-40B4-BE49-F238E27FC236}">
+                <a16:creationId xmlns:a16="http://schemas.microsoft.com/office/drawing/2014/main" id="{06F4DA8E-7016-4BEC-9A27-85368202E6F9}"/>
+              </a:ext>
+            </a:extLst>
+          </p:cNvPr>
+          <p:cNvPicPr>
+            <a:picLocks noChangeAspect="1"/>
+          </p:cNvPicPr>
+          <p:nvPr/>
+        </p:nvPicPr>
+        <p:blipFill>
+          <a:blip r:embed="rId2">
+            <a:extLst>
+              <a:ext uri="{28A0092B-C50C-407E-A947-70E740481C1C}">
+                <a14:useLocalDpi xmlns:a14="http://schemas.microsoft.com/office/drawing/2010/main" val="0"/>
+              </a:ext>
+            </a:extLst>
+          </a:blip>
+          <a:stretch>
+            <a:fillRect/>
+          </a:stretch>
+        </p:blipFill>
+        <p:spPr>
+          <a:xfrm>
+            <a:off x="2306314" y="1392096"/>
+            <a:ext cx="7579371" cy="4018105"/>
+          </a:xfrm>
+          <a:prstGeom prst="rect">
+            <a:avLst/>
+          </a:prstGeom>
+        </p:spPr>
+      </p:pic>
+    </p:spTree>
+    <p:extLst>
+      <p:ext uri="{BB962C8B-B14F-4D97-AF65-F5344CB8AC3E}">
+        <p14:creationId xmlns:p14="http://schemas.microsoft.com/office/powerpoint/2010/main" val="153811852"/>
+      </p:ext>
+    </p:extLst>
+  </p:cSld>
+  <p:clrMapOvr>
+    <a:masterClrMapping/>
+  </p:clrMapOvr>
+</p:sld>
+</file>
+
+<file path=ppt/slides/slide11.xml><?xml version="1.0" encoding="utf-8"?>
+<p:sld xmlns:a="http://schemas.openxmlformats.org/drawingml/2006/main" xmlns:r="http://schemas.openxmlformats.org/officeDocument/2006/relationships" xmlns:p="http://schemas.openxmlformats.org/presentationml/2006/main">
+  <p:cSld>
+    <p:spTree>
+      <p:nvGrpSpPr>
+        <p:cNvPr id="1" name=""/>
+        <p:cNvGrpSpPr/>
+        <p:nvPr/>
+      </p:nvGrpSpPr>
+      <p:grpSpPr>
+        <a:xfrm>
+          <a:off x="0" y="0"/>
+          <a:ext cx="0" cy="0"/>
+          <a:chOff x="0" y="0"/>
+          <a:chExt cx="0" cy="0"/>
+        </a:xfrm>
+      </p:grpSpPr>
+      <p:sp>
+        <p:nvSpPr>
+          <p:cNvPr id="2" name="Titre 1">
+            <a:extLst>
+              <a:ext uri="{FF2B5EF4-FFF2-40B4-BE49-F238E27FC236}">
+                <a16:creationId xmlns:a16="http://schemas.microsoft.com/office/drawing/2014/main" id="{842797B5-B40B-4D20-A747-6068C51487C4}"/>
+              </a:ext>
+            </a:extLst>
+          </p:cNvPr>
+          <p:cNvSpPr>
+            <a:spLocks noGrp="1"/>
+          </p:cNvSpPr>
+          <p:nvPr>
+            <p:ph type="title"/>
+          </p:nvPr>
+        </p:nvSpPr>
+        <p:spPr>
+          <a:xfrm>
+            <a:off x="2231136" y="114460"/>
+            <a:ext cx="7729728" cy="1188720"/>
+          </a:xfrm>
+        </p:spPr>
+        <p:txBody>
+          <a:bodyPr/>
+          <a:lstStyle/>
+          <a:p>
+            <a:r>
+              <a:rPr lang="fr-FR" dirty="0"/>
+              <a:t>Modélisation</a:t>
+            </a:r>
+            <a:br>
+              <a:rPr lang="fr-FR" dirty="0"/>
+            </a:br>
+            <a:r>
+              <a:rPr lang="fr-FR" dirty="0" err="1"/>
+              <a:t>deep</a:t>
+            </a:r>
+            <a:r>
+              <a:rPr lang="fr-FR" dirty="0"/>
+              <a:t> </a:t>
+            </a:r>
+            <a:r>
+              <a:rPr lang="fr-FR" dirty="0" err="1"/>
+              <a:t>learning</a:t>
+            </a:r>
+            <a:endParaRPr lang="fr-FR" dirty="0"/>
+          </a:p>
+        </p:txBody>
+      </p:sp>
+      <p:sp>
+        <p:nvSpPr>
+          <p:cNvPr id="3" name="Espace réservé du contenu 2">
+            <a:extLst>
+              <a:ext uri="{FF2B5EF4-FFF2-40B4-BE49-F238E27FC236}">
+                <a16:creationId xmlns:a16="http://schemas.microsoft.com/office/drawing/2014/main" id="{3473CF4C-0AFA-40C3-B942-695AD85AA95F}"/>
+              </a:ext>
+            </a:extLst>
+          </p:cNvPr>
+          <p:cNvSpPr>
+            <a:spLocks noGrp="1"/>
+          </p:cNvSpPr>
+          <p:nvPr>
+            <p:ph idx="1"/>
+          </p:nvPr>
+        </p:nvSpPr>
+        <p:spPr>
+          <a:xfrm>
+            <a:off x="1474779" y="1848853"/>
+            <a:ext cx="9242441" cy="1188720"/>
+          </a:xfrm>
+        </p:spPr>
+        <p:txBody>
+          <a:bodyPr/>
+          <a:lstStyle/>
+          <a:p>
+            <a:r>
+              <a:rPr lang="fr-FR" dirty="0"/>
+              <a:t>Notre modèle </a:t>
+            </a:r>
+            <a:r>
+              <a:rPr lang="fr-FR" dirty="0" err="1"/>
+              <a:t>Sequential</a:t>
+            </a:r>
+            <a:r>
+              <a:rPr lang="fr-FR" dirty="0"/>
+              <a:t> est composé de deux couches Dense avec activation </a:t>
+            </a:r>
+            <a:r>
+              <a:rPr lang="fr-FR" dirty="0" err="1"/>
+              <a:t>softmax</a:t>
+            </a:r>
+            <a:r>
+              <a:rPr lang="fr-FR" dirty="0"/>
+              <a:t>.</a:t>
+            </a:r>
+          </a:p>
+          <a:p>
+            <a:r>
+              <a:rPr lang="fr-FR" dirty="0"/>
+              <a:t>L'erreur est déterminer par un </a:t>
+            </a:r>
+            <a:r>
+              <a:rPr lang="fr-FR" dirty="0" err="1"/>
+              <a:t>categorical_crossentropy</a:t>
+            </a:r>
+            <a:r>
+              <a:rPr lang="fr-FR" dirty="0"/>
+              <a:t>.</a:t>
+            </a:r>
+          </a:p>
+          <a:p>
+            <a:r>
+              <a:rPr lang="fr-FR" dirty="0"/>
+              <a:t>On obtient une précision de 0,397</a:t>
+            </a:r>
+          </a:p>
+        </p:txBody>
+      </p:sp>
+    </p:spTree>
+    <p:extLst>
+      <p:ext uri="{BB962C8B-B14F-4D97-AF65-F5344CB8AC3E}">
+        <p14:creationId xmlns:p14="http://schemas.microsoft.com/office/powerpoint/2010/main" val="3613081408"/>
+      </p:ext>
+    </p:extLst>
+  </p:cSld>
+  <p:clrMapOvr>
+    <a:masterClrMapping/>
+  </p:clrMapOvr>
+</p:sld>
+</file>
+
+<file path=ppt/slides/slide12.xml><?xml version="1.0" encoding="utf-8"?>
+<p:sld xmlns:a="http://schemas.openxmlformats.org/drawingml/2006/main" xmlns:r="http://schemas.openxmlformats.org/officeDocument/2006/relationships" xmlns:p="http://schemas.openxmlformats.org/presentationml/2006/main">
+  <p:cSld>
+    <p:spTree>
+      <p:nvGrpSpPr>
+        <p:cNvPr id="1" name=""/>
+        <p:cNvGrpSpPr/>
+        <p:nvPr/>
+      </p:nvGrpSpPr>
+      <p:grpSpPr>
+        <a:xfrm>
+          <a:off x="0" y="0"/>
+          <a:ext cx="0" cy="0"/>
+          <a:chOff x="0" y="0"/>
+          <a:chExt cx="0" cy="0"/>
+        </a:xfrm>
+      </p:grpSpPr>
+      <p:sp>
+        <p:nvSpPr>
+          <p:cNvPr id="2" name="Titre 1">
+            <a:extLst>
+              <a:ext uri="{FF2B5EF4-FFF2-40B4-BE49-F238E27FC236}">
+                <a16:creationId xmlns:a16="http://schemas.microsoft.com/office/drawing/2014/main" id="{842797B5-B40B-4D20-A747-6068C51487C4}"/>
+              </a:ext>
+            </a:extLst>
+          </p:cNvPr>
+          <p:cNvSpPr>
+            <a:spLocks noGrp="1"/>
+          </p:cNvSpPr>
+          <p:nvPr>
+            <p:ph type="title"/>
+          </p:nvPr>
+        </p:nvSpPr>
+        <p:spPr>
+          <a:xfrm>
+            <a:off x="2231136" y="114460"/>
+            <a:ext cx="7729728" cy="1188720"/>
+          </a:xfrm>
+        </p:spPr>
+        <p:txBody>
+          <a:bodyPr/>
+          <a:lstStyle/>
+          <a:p>
+            <a:r>
+              <a:rPr lang="fr-FR" dirty="0"/>
+              <a:t>Conclusion</a:t>
+            </a:r>
+          </a:p>
+        </p:txBody>
+      </p:sp>
+      <p:sp>
+        <p:nvSpPr>
+          <p:cNvPr id="3" name="Espace réservé du contenu 2">
+            <a:extLst>
+              <a:ext uri="{FF2B5EF4-FFF2-40B4-BE49-F238E27FC236}">
+                <a16:creationId xmlns:a16="http://schemas.microsoft.com/office/drawing/2014/main" id="{3473CF4C-0AFA-40C3-B942-695AD85AA95F}"/>
+              </a:ext>
+            </a:extLst>
+          </p:cNvPr>
+          <p:cNvSpPr>
+            <a:spLocks noGrp="1"/>
+          </p:cNvSpPr>
+          <p:nvPr>
+            <p:ph idx="1"/>
+          </p:nvPr>
+        </p:nvSpPr>
+        <p:spPr>
+          <a:xfrm>
+            <a:off x="1474779" y="1848852"/>
+            <a:ext cx="9242441" cy="4182979"/>
+          </a:xfrm>
+        </p:spPr>
+        <p:txBody>
+          <a:bodyPr>
+            <a:normAutofit/>
+          </a:bodyPr>
+          <a:lstStyle/>
+          <a:p>
+            <a:r>
+              <a:rPr lang="fr-FR" dirty="0"/>
+              <a:t>Grâce à nos observations, nous pouvons en conclure que notre modèle K-NN est performant, et il est proche des résultats obtenus par les créateurs du </a:t>
+            </a:r>
+            <a:r>
+              <a:rPr lang="fr-FR" dirty="0" err="1"/>
+              <a:t>dataset</a:t>
+            </a:r>
+            <a:r>
+              <a:rPr lang="fr-FR" dirty="0"/>
+              <a:t>.</a:t>
+            </a:r>
+          </a:p>
+          <a:p>
+            <a:endParaRPr lang="fr-FR" dirty="0"/>
+          </a:p>
+          <a:p>
+            <a:r>
+              <a:rPr lang="fr-FR" dirty="0"/>
+              <a:t>Les données ne permettent pas d’exploration approfondie. Notamment, ils n’est pas possible de supprimer ou d’ajouter des </a:t>
+            </a:r>
+            <a:r>
+              <a:rPr lang="fr-FR" dirty="0" err="1"/>
+              <a:t>features</a:t>
+            </a:r>
+            <a:r>
+              <a:rPr lang="fr-FR" dirty="0"/>
+              <a:t> car elles sont dépendante les unes des autres du caractère du quel ils </a:t>
+            </a:r>
+            <a:r>
+              <a:rPr lang="fr-FR" dirty="0" err="1"/>
+              <a:t>proviennents</a:t>
+            </a:r>
+            <a:r>
+              <a:rPr lang="fr-FR" dirty="0"/>
+              <a:t>.</a:t>
+            </a:r>
+          </a:p>
+        </p:txBody>
+      </p:sp>
+    </p:spTree>
+    <p:extLst>
+      <p:ext uri="{BB962C8B-B14F-4D97-AF65-F5344CB8AC3E}">
+        <p14:creationId xmlns:p14="http://schemas.microsoft.com/office/powerpoint/2010/main" val="900552502"/>
+      </p:ext>
+    </p:extLst>
+  </p:cSld>
+  <p:clrMapOvr>
+    <a:masterClrMapping/>
+  </p:clrMapOvr>
+</p:sld>
+</file>
+
 <file path=ppt/slides/slide2.xml><?xml version="1.0" encoding="utf-8"?>
 <p:sld xmlns:a="http://schemas.openxmlformats.org/drawingml/2006/main" xmlns:r="http://schemas.openxmlformats.org/officeDocument/2006/relationships" xmlns:p="http://schemas.openxmlformats.org/presentationml/2006/main">
   <p:cSld>
@@ -4957,6 +5410,613 @@
     <p:extLst>
       <p:ext uri="{BB962C8B-B14F-4D97-AF65-F5344CB8AC3E}">
         <p14:creationId xmlns:p14="http://schemas.microsoft.com/office/powerpoint/2010/main" val="2071006617"/>
+      </p:ext>
+    </p:extLst>
+  </p:cSld>
+  <p:clrMapOvr>
+    <a:masterClrMapping/>
+  </p:clrMapOvr>
+</p:sld>
+</file>
+
+<file path=ppt/slides/slide6.xml><?xml version="1.0" encoding="utf-8"?>
+<p:sld xmlns:a="http://schemas.openxmlformats.org/drawingml/2006/main" xmlns:r="http://schemas.openxmlformats.org/officeDocument/2006/relationships" xmlns:p="http://schemas.openxmlformats.org/presentationml/2006/main">
+  <p:cSld>
+    <p:spTree>
+      <p:nvGrpSpPr>
+        <p:cNvPr id="1" name=""/>
+        <p:cNvGrpSpPr/>
+        <p:nvPr/>
+      </p:nvGrpSpPr>
+      <p:grpSpPr>
+        <a:xfrm>
+          <a:off x="0" y="0"/>
+          <a:ext cx="0" cy="0"/>
+          <a:chOff x="0" y="0"/>
+          <a:chExt cx="0" cy="0"/>
+        </a:xfrm>
+      </p:grpSpPr>
+      <p:sp>
+        <p:nvSpPr>
+          <p:cNvPr id="2" name="Titre 1">
+            <a:extLst>
+              <a:ext uri="{FF2B5EF4-FFF2-40B4-BE49-F238E27FC236}">
+                <a16:creationId xmlns:a16="http://schemas.microsoft.com/office/drawing/2014/main" id="{842797B5-B40B-4D20-A747-6068C51487C4}"/>
+              </a:ext>
+            </a:extLst>
+          </p:cNvPr>
+          <p:cNvSpPr>
+            <a:spLocks noGrp="1"/>
+          </p:cNvSpPr>
+          <p:nvPr>
+            <p:ph type="title"/>
+          </p:nvPr>
+        </p:nvSpPr>
+        <p:spPr>
+          <a:xfrm>
+            <a:off x="2231136" y="114460"/>
+            <a:ext cx="7729728" cy="1188720"/>
+          </a:xfrm>
+        </p:spPr>
+        <p:txBody>
+          <a:bodyPr/>
+          <a:lstStyle/>
+          <a:p>
+            <a:r>
+              <a:rPr lang="fr-FR" dirty="0"/>
+              <a:t>Importation des données</a:t>
+            </a:r>
+          </a:p>
+        </p:txBody>
+      </p:sp>
+      <p:sp>
+        <p:nvSpPr>
+          <p:cNvPr id="3" name="Espace réservé du contenu 2">
+            <a:extLst>
+              <a:ext uri="{FF2B5EF4-FFF2-40B4-BE49-F238E27FC236}">
+                <a16:creationId xmlns:a16="http://schemas.microsoft.com/office/drawing/2014/main" id="{3473CF4C-0AFA-40C3-B942-695AD85AA95F}"/>
+              </a:ext>
+            </a:extLst>
+          </p:cNvPr>
+          <p:cNvSpPr>
+            <a:spLocks noGrp="1"/>
+          </p:cNvSpPr>
+          <p:nvPr>
+            <p:ph idx="1"/>
+          </p:nvPr>
+        </p:nvSpPr>
+        <p:spPr>
+          <a:xfrm>
+            <a:off x="671805" y="1447800"/>
+            <a:ext cx="10755153" cy="4876800"/>
+          </a:xfrm>
+        </p:spPr>
+        <p:txBody>
+          <a:bodyPr/>
+          <a:lstStyle/>
+          <a:p>
+            <a:r>
+              <a:rPr lang="fr-FR" dirty="0"/>
+              <a:t>Nous utilisons la librairie Pandas pour importer nos csv de train et test dans des Data Frame.</a:t>
+            </a:r>
+          </a:p>
+          <a:p>
+            <a:r>
+              <a:rPr lang="fr-FR" dirty="0"/>
+              <a:t>Il n'y a aucun NA dans les données et ils sont composé uniquement d'entier.</a:t>
+            </a:r>
+          </a:p>
+          <a:p>
+            <a:endParaRPr lang="fr-FR" dirty="0"/>
+          </a:p>
+          <a:p>
+            <a:r>
+              <a:rPr lang="fr-FR" dirty="0"/>
+              <a:t>Nous fusionnons les </a:t>
+            </a:r>
+            <a:r>
+              <a:rPr lang="fr-FR" dirty="0" err="1"/>
+              <a:t>dataset</a:t>
+            </a:r>
+            <a:r>
+              <a:rPr lang="fr-FR" dirty="0"/>
+              <a:t> de train et test pour faire la visualisation des données et ainsi avoir plus de données à traiter.</a:t>
+            </a:r>
+          </a:p>
+          <a:p>
+            <a:endParaRPr lang="fr-FR" dirty="0"/>
+          </a:p>
+        </p:txBody>
+      </p:sp>
+      <p:pic>
+        <p:nvPicPr>
+          <p:cNvPr id="8" name="Graphique 7" descr="Tableau">
+            <a:extLst>
+              <a:ext uri="{FF2B5EF4-FFF2-40B4-BE49-F238E27FC236}">
+                <a16:creationId xmlns:a16="http://schemas.microsoft.com/office/drawing/2014/main" id="{3D0CBB9A-525B-43B2-BE2F-0852A3B32AD4}"/>
+              </a:ext>
+            </a:extLst>
+          </p:cNvPr>
+          <p:cNvPicPr>
+            <a:picLocks noChangeAspect="1"/>
+          </p:cNvPicPr>
+          <p:nvPr/>
+        </p:nvPicPr>
+        <p:blipFill>
+          <a:blip r:embed="rId2">
+            <a:extLst>
+              <a:ext uri="{28A0092B-C50C-407E-A947-70E740481C1C}">
+                <a14:useLocalDpi xmlns:a14="http://schemas.microsoft.com/office/drawing/2010/main" val="0"/>
+              </a:ext>
+              <a:ext uri="{96DAC541-7B7A-43D3-8B79-37D633B846F1}">
+                <asvg:svgBlip xmlns:asvg="http://schemas.microsoft.com/office/drawing/2016/SVG/main" r:embed="rId3"/>
+              </a:ext>
+            </a:extLst>
+          </a:blip>
+          <a:stretch>
+            <a:fillRect/>
+          </a:stretch>
+        </p:blipFill>
+        <p:spPr>
+          <a:xfrm>
+            <a:off x="9960864" y="4714214"/>
+            <a:ext cx="1973178" cy="1973178"/>
+          </a:xfrm>
+          <a:prstGeom prst="rect">
+            <a:avLst/>
+          </a:prstGeom>
+        </p:spPr>
+      </p:pic>
+    </p:spTree>
+    <p:extLst>
+      <p:ext uri="{BB962C8B-B14F-4D97-AF65-F5344CB8AC3E}">
+        <p14:creationId xmlns:p14="http://schemas.microsoft.com/office/powerpoint/2010/main" val="1907839509"/>
+      </p:ext>
+    </p:extLst>
+  </p:cSld>
+  <p:clrMapOvr>
+    <a:masterClrMapping/>
+  </p:clrMapOvr>
+</p:sld>
+</file>
+
+<file path=ppt/slides/slide7.xml><?xml version="1.0" encoding="utf-8"?>
+<p:sld xmlns:a="http://schemas.openxmlformats.org/drawingml/2006/main" xmlns:r="http://schemas.openxmlformats.org/officeDocument/2006/relationships" xmlns:p="http://schemas.openxmlformats.org/presentationml/2006/main">
+  <p:cSld>
+    <p:spTree>
+      <p:nvGrpSpPr>
+        <p:cNvPr id="1" name=""/>
+        <p:cNvGrpSpPr/>
+        <p:nvPr/>
+      </p:nvGrpSpPr>
+      <p:grpSpPr>
+        <a:xfrm>
+          <a:off x="0" y="0"/>
+          <a:ext cx="0" cy="0"/>
+          <a:chOff x="0" y="0"/>
+          <a:chExt cx="0" cy="0"/>
+        </a:xfrm>
+      </p:grpSpPr>
+      <p:sp>
+        <p:nvSpPr>
+          <p:cNvPr id="2" name="Titre 1">
+            <a:extLst>
+              <a:ext uri="{FF2B5EF4-FFF2-40B4-BE49-F238E27FC236}">
+                <a16:creationId xmlns:a16="http://schemas.microsoft.com/office/drawing/2014/main" id="{842797B5-B40B-4D20-A747-6068C51487C4}"/>
+              </a:ext>
+            </a:extLst>
+          </p:cNvPr>
+          <p:cNvSpPr>
+            <a:spLocks noGrp="1"/>
+          </p:cNvSpPr>
+          <p:nvPr>
+            <p:ph type="title"/>
+          </p:nvPr>
+        </p:nvSpPr>
+        <p:spPr>
+          <a:xfrm>
+            <a:off x="2231136" y="114460"/>
+            <a:ext cx="7729728" cy="1188720"/>
+          </a:xfrm>
+        </p:spPr>
+        <p:txBody>
+          <a:bodyPr/>
+          <a:lstStyle/>
+          <a:p>
+            <a:r>
+              <a:rPr lang="fr-FR" dirty="0"/>
+              <a:t>Visualisation des données</a:t>
+            </a:r>
+            <a:br>
+              <a:rPr lang="fr-FR" dirty="0"/>
+            </a:br>
+            <a:r>
+              <a:rPr lang="fr-FR" dirty="0"/>
+              <a:t>Répartition des classes</a:t>
+            </a:r>
+          </a:p>
+        </p:txBody>
+      </p:sp>
+      <p:sp>
+        <p:nvSpPr>
+          <p:cNvPr id="3" name="Espace réservé du contenu 2">
+            <a:extLst>
+              <a:ext uri="{FF2B5EF4-FFF2-40B4-BE49-F238E27FC236}">
+                <a16:creationId xmlns:a16="http://schemas.microsoft.com/office/drawing/2014/main" id="{3473CF4C-0AFA-40C3-B942-695AD85AA95F}"/>
+              </a:ext>
+            </a:extLst>
+          </p:cNvPr>
+          <p:cNvSpPr>
+            <a:spLocks noGrp="1"/>
+          </p:cNvSpPr>
+          <p:nvPr>
+            <p:ph idx="1"/>
+          </p:nvPr>
+        </p:nvSpPr>
+        <p:spPr>
+          <a:xfrm>
+            <a:off x="718423" y="5410200"/>
+            <a:ext cx="10755153" cy="1760621"/>
+          </a:xfrm>
+        </p:spPr>
+        <p:txBody>
+          <a:bodyPr/>
+          <a:lstStyle/>
+          <a:p>
+            <a:r>
+              <a:rPr lang="fr-FR" dirty="0"/>
+              <a:t>Nous observons que toutes les classes sont </a:t>
+            </a:r>
+            <a:r>
+              <a:rPr lang="fr-FR" dirty="0" err="1"/>
+              <a:t>homogénétiquement</a:t>
+            </a:r>
+            <a:r>
+              <a:rPr lang="fr-FR" dirty="0"/>
+              <a:t> répartie ce qui permettra d'avoir des résultats plus efficace lors des modèles de prédiction.</a:t>
+            </a:r>
+          </a:p>
+        </p:txBody>
+      </p:sp>
+      <p:pic>
+        <p:nvPicPr>
+          <p:cNvPr id="5" name="Image 4">
+            <a:extLst>
+              <a:ext uri="{FF2B5EF4-FFF2-40B4-BE49-F238E27FC236}">
+                <a16:creationId xmlns:a16="http://schemas.microsoft.com/office/drawing/2014/main" id="{6D2FE8D7-EED9-4CBC-9FE0-7E196948BE65}"/>
+              </a:ext>
+            </a:extLst>
+          </p:cNvPr>
+          <p:cNvPicPr>
+            <a:picLocks noChangeAspect="1"/>
+          </p:cNvPicPr>
+          <p:nvPr/>
+        </p:nvPicPr>
+        <p:blipFill>
+          <a:blip r:embed="rId2">
+            <a:extLst>
+              <a:ext uri="{28A0092B-C50C-407E-A947-70E740481C1C}">
+                <a14:useLocalDpi xmlns:a14="http://schemas.microsoft.com/office/drawing/2010/main" val="0"/>
+              </a:ext>
+            </a:extLst>
+          </a:blip>
+          <a:stretch>
+            <a:fillRect/>
+          </a:stretch>
+        </p:blipFill>
+        <p:spPr>
+          <a:xfrm>
+            <a:off x="2231136" y="1448222"/>
+            <a:ext cx="7729728" cy="3816935"/>
+          </a:xfrm>
+          <a:prstGeom prst="rect">
+            <a:avLst/>
+          </a:prstGeom>
+        </p:spPr>
+      </p:pic>
+    </p:spTree>
+    <p:extLst>
+      <p:ext uri="{BB962C8B-B14F-4D97-AF65-F5344CB8AC3E}">
+        <p14:creationId xmlns:p14="http://schemas.microsoft.com/office/powerpoint/2010/main" val="1438152539"/>
+      </p:ext>
+    </p:extLst>
+  </p:cSld>
+  <p:clrMapOvr>
+    <a:masterClrMapping/>
+  </p:clrMapOvr>
+</p:sld>
+</file>
+
+<file path=ppt/slides/slide8.xml><?xml version="1.0" encoding="utf-8"?>
+<p:sld xmlns:a="http://schemas.openxmlformats.org/drawingml/2006/main" xmlns:r="http://schemas.openxmlformats.org/officeDocument/2006/relationships" xmlns:p="http://schemas.openxmlformats.org/presentationml/2006/main">
+  <p:cSld>
+    <p:spTree>
+      <p:nvGrpSpPr>
+        <p:cNvPr id="1" name=""/>
+        <p:cNvGrpSpPr/>
+        <p:nvPr/>
+      </p:nvGrpSpPr>
+      <p:grpSpPr>
+        <a:xfrm>
+          <a:off x="0" y="0"/>
+          <a:ext cx="0" cy="0"/>
+          <a:chOff x="0" y="0"/>
+          <a:chExt cx="0" cy="0"/>
+        </a:xfrm>
+      </p:grpSpPr>
+      <p:sp>
+        <p:nvSpPr>
+          <p:cNvPr id="2" name="Titre 1">
+            <a:extLst>
+              <a:ext uri="{FF2B5EF4-FFF2-40B4-BE49-F238E27FC236}">
+                <a16:creationId xmlns:a16="http://schemas.microsoft.com/office/drawing/2014/main" id="{842797B5-B40B-4D20-A747-6068C51487C4}"/>
+              </a:ext>
+            </a:extLst>
+          </p:cNvPr>
+          <p:cNvSpPr>
+            <a:spLocks noGrp="1"/>
+          </p:cNvSpPr>
+          <p:nvPr>
+            <p:ph type="title"/>
+          </p:nvPr>
+        </p:nvSpPr>
+        <p:spPr>
+          <a:xfrm>
+            <a:off x="2231136" y="114460"/>
+            <a:ext cx="7729728" cy="1188720"/>
+          </a:xfrm>
+        </p:spPr>
+        <p:txBody>
+          <a:bodyPr/>
+          <a:lstStyle/>
+          <a:p>
+            <a:r>
+              <a:rPr lang="fr-FR" dirty="0"/>
+              <a:t>Visualisation des données</a:t>
+            </a:r>
+            <a:br>
+              <a:rPr lang="fr-FR" dirty="0"/>
+            </a:br>
+            <a:r>
+              <a:rPr lang="fr-FR" dirty="0"/>
+              <a:t>Répartition des valeurs</a:t>
+            </a:r>
+          </a:p>
+        </p:txBody>
+      </p:sp>
+      <p:sp>
+        <p:nvSpPr>
+          <p:cNvPr id="3" name="Espace réservé du contenu 2">
+            <a:extLst>
+              <a:ext uri="{FF2B5EF4-FFF2-40B4-BE49-F238E27FC236}">
+                <a16:creationId xmlns:a16="http://schemas.microsoft.com/office/drawing/2014/main" id="{3473CF4C-0AFA-40C3-B942-695AD85AA95F}"/>
+              </a:ext>
+            </a:extLst>
+          </p:cNvPr>
+          <p:cNvSpPr>
+            <a:spLocks noGrp="1"/>
+          </p:cNvSpPr>
+          <p:nvPr>
+            <p:ph idx="1"/>
+          </p:nvPr>
+        </p:nvSpPr>
+        <p:spPr>
+          <a:xfrm>
+            <a:off x="718423" y="5410200"/>
+            <a:ext cx="9242441" cy="1760621"/>
+          </a:xfrm>
+        </p:spPr>
+        <p:txBody>
+          <a:bodyPr/>
+          <a:lstStyle/>
+          <a:p>
+            <a:r>
+              <a:rPr lang="fr-FR" dirty="0"/>
+              <a:t>Ce graphique montre pour chaque </a:t>
+            </a:r>
+            <a:r>
+              <a:rPr lang="fr-FR" dirty="0" err="1"/>
+              <a:t>features</a:t>
+            </a:r>
+            <a:r>
+              <a:rPr lang="fr-FR" dirty="0"/>
+              <a:t>, les valeurs d'entiers sachant qu'ils sont tous compris entre 0 et 100.</a:t>
+            </a:r>
+          </a:p>
+          <a:p>
+            <a:r>
+              <a:rPr lang="fr-FR" dirty="0"/>
+              <a:t>Nous observons une que les valeurs sont en plus grand nombre aux extrêmes ainsi qu'au milieu.</a:t>
+            </a:r>
+          </a:p>
+        </p:txBody>
+      </p:sp>
+      <p:pic>
+        <p:nvPicPr>
+          <p:cNvPr id="6" name="Image 5">
+            <a:extLst>
+              <a:ext uri="{FF2B5EF4-FFF2-40B4-BE49-F238E27FC236}">
+                <a16:creationId xmlns:a16="http://schemas.microsoft.com/office/drawing/2014/main" id="{A47449ED-24DF-4922-94C1-8202506F5302}"/>
+              </a:ext>
+            </a:extLst>
+          </p:cNvPr>
+          <p:cNvPicPr>
+            <a:picLocks noChangeAspect="1"/>
+          </p:cNvPicPr>
+          <p:nvPr/>
+        </p:nvPicPr>
+        <p:blipFill>
+          <a:blip r:embed="rId2">
+            <a:extLst>
+              <a:ext uri="{28A0092B-C50C-407E-A947-70E740481C1C}">
+                <a14:useLocalDpi xmlns:a14="http://schemas.microsoft.com/office/drawing/2010/main" val="0"/>
+              </a:ext>
+            </a:extLst>
+          </a:blip>
+          <a:stretch>
+            <a:fillRect/>
+          </a:stretch>
+        </p:blipFill>
+        <p:spPr>
+          <a:xfrm>
+            <a:off x="2566737" y="1303180"/>
+            <a:ext cx="9535952" cy="4892843"/>
+          </a:xfrm>
+          <a:prstGeom prst="rect">
+            <a:avLst/>
+          </a:prstGeom>
+        </p:spPr>
+      </p:pic>
+    </p:spTree>
+    <p:extLst>
+      <p:ext uri="{BB962C8B-B14F-4D97-AF65-F5344CB8AC3E}">
+        <p14:creationId xmlns:p14="http://schemas.microsoft.com/office/powerpoint/2010/main" val="218480290"/>
+      </p:ext>
+    </p:extLst>
+  </p:cSld>
+  <p:clrMapOvr>
+    <a:masterClrMapping/>
+  </p:clrMapOvr>
+</p:sld>
+</file>
+
+<file path=ppt/slides/slide9.xml><?xml version="1.0" encoding="utf-8"?>
+<p:sld xmlns:a="http://schemas.openxmlformats.org/drawingml/2006/main" xmlns:r="http://schemas.openxmlformats.org/officeDocument/2006/relationships" xmlns:p="http://schemas.openxmlformats.org/presentationml/2006/main">
+  <p:cSld>
+    <p:spTree>
+      <p:nvGrpSpPr>
+        <p:cNvPr id="1" name=""/>
+        <p:cNvGrpSpPr/>
+        <p:nvPr/>
+      </p:nvGrpSpPr>
+      <p:grpSpPr>
+        <a:xfrm>
+          <a:off x="0" y="0"/>
+          <a:ext cx="0" cy="0"/>
+          <a:chOff x="0" y="0"/>
+          <a:chExt cx="0" cy="0"/>
+        </a:xfrm>
+      </p:grpSpPr>
+      <p:sp>
+        <p:nvSpPr>
+          <p:cNvPr id="2" name="Titre 1">
+            <a:extLst>
+              <a:ext uri="{FF2B5EF4-FFF2-40B4-BE49-F238E27FC236}">
+                <a16:creationId xmlns:a16="http://schemas.microsoft.com/office/drawing/2014/main" id="{842797B5-B40B-4D20-A747-6068C51487C4}"/>
+              </a:ext>
+            </a:extLst>
+          </p:cNvPr>
+          <p:cNvSpPr>
+            <a:spLocks noGrp="1"/>
+          </p:cNvSpPr>
+          <p:nvPr>
+            <p:ph type="title"/>
+          </p:nvPr>
+        </p:nvSpPr>
+        <p:spPr>
+          <a:xfrm>
+            <a:off x="2231136" y="114460"/>
+            <a:ext cx="7729728" cy="1188720"/>
+          </a:xfrm>
+        </p:spPr>
+        <p:txBody>
+          <a:bodyPr/>
+          <a:lstStyle/>
+          <a:p>
+            <a:r>
+              <a:rPr lang="fr-FR"/>
+              <a:t>Modélisation</a:t>
+            </a:r>
+            <a:br>
+              <a:rPr lang="fr-FR"/>
+            </a:br>
+            <a:r>
+              <a:rPr lang="fr-FR"/>
+              <a:t>K-NN</a:t>
+            </a:r>
+            <a:endParaRPr lang="fr-FR" dirty="0"/>
+          </a:p>
+        </p:txBody>
+      </p:sp>
+      <p:sp>
+        <p:nvSpPr>
+          <p:cNvPr id="3" name="Espace réservé du contenu 2">
+            <a:extLst>
+              <a:ext uri="{FF2B5EF4-FFF2-40B4-BE49-F238E27FC236}">
+                <a16:creationId xmlns:a16="http://schemas.microsoft.com/office/drawing/2014/main" id="{3473CF4C-0AFA-40C3-B942-695AD85AA95F}"/>
+              </a:ext>
+            </a:extLst>
+          </p:cNvPr>
+          <p:cNvSpPr>
+            <a:spLocks noGrp="1"/>
+          </p:cNvSpPr>
+          <p:nvPr>
+            <p:ph idx="1"/>
+          </p:nvPr>
+        </p:nvSpPr>
+        <p:spPr>
+          <a:xfrm>
+            <a:off x="718423" y="5410201"/>
+            <a:ext cx="9242441" cy="1188720"/>
+          </a:xfrm>
+        </p:spPr>
+        <p:txBody>
+          <a:bodyPr/>
+          <a:lstStyle/>
+          <a:p>
+            <a:r>
+              <a:rPr lang="fr-FR" dirty="0"/>
+              <a:t>Dans un premier nous déterminons la meilleur valeur de K voisinage.</a:t>
+            </a:r>
+          </a:p>
+          <a:p>
+            <a:r>
+              <a:rPr lang="fr-FR" dirty="0"/>
+              <a:t>Nous trouvons un K=3 pour une précision de 0.978.</a:t>
+            </a:r>
+          </a:p>
+        </p:txBody>
+      </p:sp>
+      <p:pic>
+        <p:nvPicPr>
+          <p:cNvPr id="5" name="Image 4">
+            <a:extLst>
+              <a:ext uri="{FF2B5EF4-FFF2-40B4-BE49-F238E27FC236}">
+                <a16:creationId xmlns:a16="http://schemas.microsoft.com/office/drawing/2014/main" id="{386FEBA4-5682-4AB6-B5A1-E244AF9E8A2F}"/>
+              </a:ext>
+            </a:extLst>
+          </p:cNvPr>
+          <p:cNvPicPr>
+            <a:picLocks noChangeAspect="1"/>
+          </p:cNvPicPr>
+          <p:nvPr/>
+        </p:nvPicPr>
+        <p:blipFill>
+          <a:blip r:embed="rId2">
+            <a:extLst>
+              <a:ext uri="{28A0092B-C50C-407E-A947-70E740481C1C}">
+                <a14:useLocalDpi xmlns:a14="http://schemas.microsoft.com/office/drawing/2010/main" val="0"/>
+              </a:ext>
+            </a:extLst>
+          </a:blip>
+          <a:stretch>
+            <a:fillRect/>
+          </a:stretch>
+        </p:blipFill>
+        <p:spPr>
+          <a:xfrm>
+            <a:off x="2608481" y="1457041"/>
+            <a:ext cx="6975038" cy="3662605"/>
+          </a:xfrm>
+          <a:prstGeom prst="rect">
+            <a:avLst/>
+          </a:prstGeom>
+        </p:spPr>
+      </p:pic>
+    </p:spTree>
+    <p:extLst>
+      <p:ext uri="{BB962C8B-B14F-4D97-AF65-F5344CB8AC3E}">
+        <p14:creationId xmlns:p14="http://schemas.microsoft.com/office/powerpoint/2010/main" val="1267997731"/>
       </p:ext>
     </p:extLst>
   </p:cSld>

</xml_diff>